<commit_message>
V03 Cafe Talk I
</commit_message>
<xml_diff>
--- a/CafeTalks/20170604_CafeTalkIPresentation_v02.pptx
+++ b/CafeTalks/20170604_CafeTalkIPresentation_v02.pptx
@@ -5,7 +5,7 @@
     <p:sldMasterId id="2147483648" r:id="rId3"/>
   </p:sldMasterIdLst>
   <p:notesMasterIdLst>
-    <p:notesMasterId r:id="rId14"/>
+    <p:notesMasterId r:id="rId15"/>
   </p:notesMasterIdLst>
   <p:sldIdLst>
     <p:sldId id="258" r:id="rId4"/>
@@ -18,6 +18,7 @@
     <p:sldId id="263" r:id="rId11"/>
     <p:sldId id="265" r:id="rId12"/>
     <p:sldId id="266" r:id="rId13"/>
+    <p:sldId id="272" r:id="rId14"/>
   </p:sldIdLst>
   <p:sldSz cx="12192000" cy="6858000"/>
   <p:notesSz cx="6858000" cy="9144000"/>
@@ -124,6 +125,1164 @@
 </p:presentation>
 </file>
 
+<file path=ppt/charts/chart1.xml><?xml version="1.0" encoding="utf-8"?>
+<c:chartSpace xmlns:c="http://schemas.openxmlformats.org/drawingml/2006/chart" xmlns:a="http://schemas.openxmlformats.org/drawingml/2006/main" xmlns:r="http://schemas.openxmlformats.org/officeDocument/2006/relationships">
+  <c:date1904 val="0"/>
+  <c:lang val="en-US"/>
+  <c:roundedCorners val="0"/>
+  <mc:AlternateContent xmlns:mc="http://schemas.openxmlformats.org/markup-compatibility/2006">
+    <mc:Choice xmlns:c14="http://schemas.microsoft.com/office/drawing/2007/8/2/chart" Requires="c14">
+      <c14:style val="102"/>
+    </mc:Choice>
+    <mc:Fallback>
+      <c:style val="2"/>
+    </mc:Fallback>
+  </mc:AlternateContent>
+  <c:clrMapOvr bg1="lt1" tx1="dk1" bg2="lt2" tx2="dk2" accent1="accent1" accent2="accent2" accent3="accent3" accent4="accent4" accent5="accent5" accent6="accent6" hlink="hlink" folHlink="folHlink"/>
+  <c:chart>
+    <c:autoTitleDeleted val="0"/>
+    <c:plotArea>
+      <c:layout/>
+      <c:barChart>
+        <c:barDir val="bar"/>
+        <c:grouping val="stacked"/>
+        <c:varyColors val="0"/>
+        <c:ser>
+          <c:idx val="0"/>
+          <c:order val="0"/>
+          <c:tx>
+            <c:strRef>
+              <c:f>Sheet1!$C$1</c:f>
+              <c:strCache>
+                <c:ptCount val="1"/>
+                <c:pt idx="0">
+                  <c:v>start</c:v>
+                </c:pt>
+              </c:strCache>
+            </c:strRef>
+          </c:tx>
+          <c:spPr>
+            <a:noFill/>
+            <a:ln>
+              <a:noFill/>
+            </a:ln>
+            <a:effectLst/>
+          </c:spPr>
+          <c:invertIfNegative val="0"/>
+          <c:cat>
+            <c:multiLvlStrRef>
+              <c:f>Sheet1!$A$2:$B$32</c:f>
+              <c:multiLvlStrCache>
+                <c:ptCount val="31"/>
+                <c:lvl>
+                  <c:pt idx="0">
+                    <c:v>Understand Social and Public Health considerations of sidewalks</c:v>
+                  </c:pt>
+                  <c:pt idx="1">
+                    <c:v>Pedestrian Safety concerns</c:v>
+                  </c:pt>
+                  <c:pt idx="2">
+                    <c:v>Persons with Physical Difficulties</c:v>
+                  </c:pt>
+                  <c:pt idx="3">
+                    <c:v>Other Approaches to the Problem – Neighborhood Audits</c:v>
+                  </c:pt>
+                  <c:pt idx="4">
+                    <c:v>Python Image Processing Knowledge</c:v>
+                  </c:pt>
+                  <c:pt idx="5">
+                    <c:v>Google/Bing Street View API Knowledge</c:v>
+                  </c:pt>
+                  <c:pt idx="6">
+                    <c:v>Machine Learning/Neural Networks with Images</c:v>
+                  </c:pt>
+                  <c:pt idx="7">
+                    <c:v>Best Practices for improving performance in image classification problems</c:v>
+                  </c:pt>
+                  <c:pt idx="8">
+                    <c:v>GIS (Geographic Information System) file formats and interchanges</c:v>
+                  </c:pt>
+                  <c:pt idx="9">
+                    <c:v>Development of Machine Learning/Neural Network, Cross Validation, Testing</c:v>
+                  </c:pt>
+                  <c:pt idx="11">
+                    <c:v>Google/Bing Image Collection with Geographic Data</c:v>
+                  </c:pt>
+                  <c:pt idx="12">
+                    <c:v>Labeling of Images for Training and Test</c:v>
+                  </c:pt>
+                  <c:pt idx="14">
+                    <c:v>Development of Machine Learning/Neural Network, Cross Validation, Testing</c:v>
+                  </c:pt>
+                  <c:pt idx="15">
+                    <c:v>Binary Sidewalk detector, investigate convolutional architectures for automatically labeling sidewalks in images (10 days)</c:v>
+                  </c:pt>
+                  <c:pt idx="16">
+                    <c:v>Sidewalk quality detection, adapt architectures for detection and quality classification</c:v>
+                  </c:pt>
+                  <c:pt idx="17">
+                    <c:v>Parameters tuning and further architecture exploration</c:v>
+                  </c:pt>
+                  <c:pt idx="18">
+                    <c:v>Evaluation of models to other neighborhoods</c:v>
+                  </c:pt>
+                  <c:pt idx="19">
+                    <c:v> Identification of individual labels that contribute to overall rating</c:v>
+                  </c:pt>
+                  <c:pt idx="21">
+                    <c:v>Written Paper - 1st Draft</c:v>
+                  </c:pt>
+                  <c:pt idx="22">
+                    <c:v>Poster Creation</c:v>
+                  </c:pt>
+                  <c:pt idx="23">
+                    <c:v>Poster Printing/Shipping</c:v>
+                  </c:pt>
+                  <c:pt idx="26">
+                    <c:v>Problem Proposal</c:v>
+                  </c:pt>
+                  <c:pt idx="27">
+                    <c:v>Café Talk I</c:v>
+                  </c:pt>
+                  <c:pt idx="28">
+                    <c:v>First Paper Draft Due</c:v>
+                  </c:pt>
+                  <c:pt idx="29">
+                    <c:v>Café Talk II</c:v>
+                  </c:pt>
+                  <c:pt idx="30">
+                    <c:v>Final Poster Presentation</c:v>
+                  </c:pt>
+                </c:lvl>
+                <c:lvl>
+                  <c:pt idx="0">
+                    <c:v>Domain Knowledge Research</c:v>
+                  </c:pt>
+                  <c:pt idx="4">
+                    <c:v>API/Technical Requirements</c:v>
+                  </c:pt>
+                  <c:pt idx="10">
+                    <c:v>Image Sourcing and Labeling</c:v>
+                  </c:pt>
+                  <c:pt idx="13">
+                    <c:v>Model Development</c:v>
+                  </c:pt>
+                  <c:pt idx="20">
+                    <c:v>Documentation</c:v>
+                  </c:pt>
+                  <c:pt idx="25">
+                    <c:v>Presentation/Review Steps</c:v>
+                  </c:pt>
+                </c:lvl>
+              </c:multiLvlStrCache>
+            </c:multiLvlStrRef>
+          </c:cat>
+          <c:val>
+            <c:numRef>
+              <c:f>Sheet1!$C$2:$C$32</c:f>
+              <c:numCache>
+                <c:formatCode>m/d/yyyy</c:formatCode>
+                <c:ptCount val="31"/>
+                <c:pt idx="0">
+                  <c:v>42879</c:v>
+                </c:pt>
+                <c:pt idx="1">
+                  <c:v>42879</c:v>
+                </c:pt>
+                <c:pt idx="2">
+                  <c:v>42879</c:v>
+                </c:pt>
+                <c:pt idx="3">
+                  <c:v>42879</c:v>
+                </c:pt>
+                <c:pt idx="4">
+                  <c:v>42889</c:v>
+                </c:pt>
+                <c:pt idx="5">
+                  <c:v>42889</c:v>
+                </c:pt>
+                <c:pt idx="6">
+                  <c:v>42889</c:v>
+                </c:pt>
+                <c:pt idx="7">
+                  <c:v>42889</c:v>
+                </c:pt>
+                <c:pt idx="8">
+                  <c:v>42922</c:v>
+                </c:pt>
+                <c:pt idx="11">
+                  <c:v>42900</c:v>
+                </c:pt>
+                <c:pt idx="12">
+                  <c:v>42901</c:v>
+                </c:pt>
+                <c:pt idx="14">
+                  <c:v>42901</c:v>
+                </c:pt>
+                <c:pt idx="15">
+                  <c:v>42903</c:v>
+                </c:pt>
+                <c:pt idx="16">
+                  <c:v>42911</c:v>
+                </c:pt>
+                <c:pt idx="17">
+                  <c:v>42921</c:v>
+                </c:pt>
+                <c:pt idx="18">
+                  <c:v>42931</c:v>
+                </c:pt>
+                <c:pt idx="19">
+                  <c:v>42941</c:v>
+                </c:pt>
+                <c:pt idx="21">
+                  <c:v>42887</c:v>
+                </c:pt>
+                <c:pt idx="22">
+                  <c:v>42979</c:v>
+                </c:pt>
+                <c:pt idx="23">
+                  <c:v>43024</c:v>
+                </c:pt>
+                <c:pt idx="26">
+                  <c:v>42879</c:v>
+                </c:pt>
+                <c:pt idx="27">
+                  <c:v>42892</c:v>
+                </c:pt>
+                <c:pt idx="28">
+                  <c:v>42921</c:v>
+                </c:pt>
+                <c:pt idx="29">
+                  <c:v>42927</c:v>
+                </c:pt>
+                <c:pt idx="30">
+                  <c:v>43048</c:v>
+                </c:pt>
+              </c:numCache>
+            </c:numRef>
+          </c:val>
+        </c:ser>
+        <c:ser>
+          <c:idx val="1"/>
+          <c:order val="1"/>
+          <c:tx>
+            <c:strRef>
+              <c:f>Sheet1!$D$1</c:f>
+              <c:strCache>
+                <c:ptCount val="1"/>
+                <c:pt idx="0">
+                  <c:v>duration</c:v>
+                </c:pt>
+              </c:strCache>
+            </c:strRef>
+          </c:tx>
+          <c:spPr>
+            <a:solidFill>
+              <a:schemeClr val="accent2"/>
+            </a:solidFill>
+            <a:ln>
+              <a:noFill/>
+            </a:ln>
+            <a:effectLst/>
+          </c:spPr>
+          <c:invertIfNegative val="0"/>
+          <c:cat>
+            <c:multiLvlStrRef>
+              <c:f>Sheet1!$A$2:$B$32</c:f>
+              <c:multiLvlStrCache>
+                <c:ptCount val="31"/>
+                <c:lvl>
+                  <c:pt idx="0">
+                    <c:v>Understand Social and Public Health considerations of sidewalks</c:v>
+                  </c:pt>
+                  <c:pt idx="1">
+                    <c:v>Pedestrian Safety concerns</c:v>
+                  </c:pt>
+                  <c:pt idx="2">
+                    <c:v>Persons with Physical Difficulties</c:v>
+                  </c:pt>
+                  <c:pt idx="3">
+                    <c:v>Other Approaches to the Problem – Neighborhood Audits</c:v>
+                  </c:pt>
+                  <c:pt idx="4">
+                    <c:v>Python Image Processing Knowledge</c:v>
+                  </c:pt>
+                  <c:pt idx="5">
+                    <c:v>Google/Bing Street View API Knowledge</c:v>
+                  </c:pt>
+                  <c:pt idx="6">
+                    <c:v>Machine Learning/Neural Networks with Images</c:v>
+                  </c:pt>
+                  <c:pt idx="7">
+                    <c:v>Best Practices for improving performance in image classification problems</c:v>
+                  </c:pt>
+                  <c:pt idx="8">
+                    <c:v>GIS (Geographic Information System) file formats and interchanges</c:v>
+                  </c:pt>
+                  <c:pt idx="9">
+                    <c:v>Development of Machine Learning/Neural Network, Cross Validation, Testing</c:v>
+                  </c:pt>
+                  <c:pt idx="11">
+                    <c:v>Google/Bing Image Collection with Geographic Data</c:v>
+                  </c:pt>
+                  <c:pt idx="12">
+                    <c:v>Labeling of Images for Training and Test</c:v>
+                  </c:pt>
+                  <c:pt idx="14">
+                    <c:v>Development of Machine Learning/Neural Network, Cross Validation, Testing</c:v>
+                  </c:pt>
+                  <c:pt idx="15">
+                    <c:v>Binary Sidewalk detector, investigate convolutional architectures for automatically labeling sidewalks in images (10 days)</c:v>
+                  </c:pt>
+                  <c:pt idx="16">
+                    <c:v>Sidewalk quality detection, adapt architectures for detection and quality classification</c:v>
+                  </c:pt>
+                  <c:pt idx="17">
+                    <c:v>Parameters tuning and further architecture exploration</c:v>
+                  </c:pt>
+                  <c:pt idx="18">
+                    <c:v>Evaluation of models to other neighborhoods</c:v>
+                  </c:pt>
+                  <c:pt idx="19">
+                    <c:v> Identification of individual labels that contribute to overall rating</c:v>
+                  </c:pt>
+                  <c:pt idx="21">
+                    <c:v>Written Paper - 1st Draft</c:v>
+                  </c:pt>
+                  <c:pt idx="22">
+                    <c:v>Poster Creation</c:v>
+                  </c:pt>
+                  <c:pt idx="23">
+                    <c:v>Poster Printing/Shipping</c:v>
+                  </c:pt>
+                  <c:pt idx="26">
+                    <c:v>Problem Proposal</c:v>
+                  </c:pt>
+                  <c:pt idx="27">
+                    <c:v>Café Talk I</c:v>
+                  </c:pt>
+                  <c:pt idx="28">
+                    <c:v>First Paper Draft Due</c:v>
+                  </c:pt>
+                  <c:pt idx="29">
+                    <c:v>Café Talk II</c:v>
+                  </c:pt>
+                  <c:pt idx="30">
+                    <c:v>Final Poster Presentation</c:v>
+                  </c:pt>
+                </c:lvl>
+                <c:lvl>
+                  <c:pt idx="0">
+                    <c:v>Domain Knowledge Research</c:v>
+                  </c:pt>
+                  <c:pt idx="4">
+                    <c:v>API/Technical Requirements</c:v>
+                  </c:pt>
+                  <c:pt idx="10">
+                    <c:v>Image Sourcing and Labeling</c:v>
+                  </c:pt>
+                  <c:pt idx="13">
+                    <c:v>Model Development</c:v>
+                  </c:pt>
+                  <c:pt idx="20">
+                    <c:v>Documentation</c:v>
+                  </c:pt>
+                  <c:pt idx="25">
+                    <c:v>Presentation/Review Steps</c:v>
+                  </c:pt>
+                </c:lvl>
+              </c:multiLvlStrCache>
+            </c:multiLvlStrRef>
+          </c:cat>
+          <c:val>
+            <c:numRef>
+              <c:f>Sheet1!$D$2:$D$32</c:f>
+              <c:numCache>
+                <c:formatCode>General</c:formatCode>
+                <c:ptCount val="31"/>
+                <c:pt idx="0">
+                  <c:v>20</c:v>
+                </c:pt>
+                <c:pt idx="1">
+                  <c:v>20</c:v>
+                </c:pt>
+                <c:pt idx="2">
+                  <c:v>20</c:v>
+                </c:pt>
+                <c:pt idx="3">
+                  <c:v>20</c:v>
+                </c:pt>
+                <c:pt idx="4">
+                  <c:v>20</c:v>
+                </c:pt>
+                <c:pt idx="5">
+                  <c:v>10</c:v>
+                </c:pt>
+                <c:pt idx="6">
+                  <c:v>20</c:v>
+                </c:pt>
+                <c:pt idx="7">
+                  <c:v>20</c:v>
+                </c:pt>
+                <c:pt idx="8">
+                  <c:v>5</c:v>
+                </c:pt>
+                <c:pt idx="11">
+                  <c:v>1</c:v>
+                </c:pt>
+                <c:pt idx="12">
+                  <c:v>10</c:v>
+                </c:pt>
+                <c:pt idx="14">
+                  <c:v>75</c:v>
+                </c:pt>
+                <c:pt idx="15">
+                  <c:v>10</c:v>
+                </c:pt>
+                <c:pt idx="16">
+                  <c:v>15</c:v>
+                </c:pt>
+                <c:pt idx="17">
+                  <c:v>15</c:v>
+                </c:pt>
+                <c:pt idx="18">
+                  <c:v>10</c:v>
+                </c:pt>
+                <c:pt idx="19">
+                  <c:v>20</c:v>
+                </c:pt>
+                <c:pt idx="21">
+                  <c:v>34</c:v>
+                </c:pt>
+                <c:pt idx="22">
+                  <c:v>45</c:v>
+                </c:pt>
+                <c:pt idx="23">
+                  <c:v>10</c:v>
+                </c:pt>
+                <c:pt idx="26">
+                  <c:v>7</c:v>
+                </c:pt>
+                <c:pt idx="27">
+                  <c:v>1</c:v>
+                </c:pt>
+                <c:pt idx="28">
+                  <c:v>1</c:v>
+                </c:pt>
+                <c:pt idx="29">
+                  <c:v>1</c:v>
+                </c:pt>
+                <c:pt idx="30">
+                  <c:v>1</c:v>
+                </c:pt>
+              </c:numCache>
+            </c:numRef>
+          </c:val>
+        </c:ser>
+        <c:dLbls>
+          <c:showLegendKey val="0"/>
+          <c:showVal val="0"/>
+          <c:showCatName val="0"/>
+          <c:showSerName val="0"/>
+          <c:showPercent val="0"/>
+          <c:showBubbleSize val="0"/>
+        </c:dLbls>
+        <c:gapWidth val="182"/>
+        <c:overlap val="100"/>
+        <c:axId val="711894336"/>
+        <c:axId val="711894728"/>
+      </c:barChart>
+      <c:catAx>
+        <c:axId val="711894336"/>
+        <c:scaling>
+          <c:orientation val="maxMin"/>
+        </c:scaling>
+        <c:delete val="0"/>
+        <c:axPos val="l"/>
+        <c:numFmt formatCode="General" sourceLinked="1"/>
+        <c:majorTickMark val="none"/>
+        <c:minorTickMark val="none"/>
+        <c:tickLblPos val="nextTo"/>
+        <c:spPr>
+          <a:noFill/>
+          <a:ln w="9525" cap="flat" cmpd="sng" algn="ctr">
+            <a:solidFill>
+              <a:schemeClr val="tx1">
+                <a:lumMod val="15000"/>
+                <a:lumOff val="85000"/>
+              </a:schemeClr>
+            </a:solidFill>
+            <a:round/>
+          </a:ln>
+          <a:effectLst/>
+        </c:spPr>
+        <c:txPr>
+          <a:bodyPr rot="-60000000" spcFirstLastPara="1" vertOverflow="ellipsis" vert="horz" wrap="square" anchor="ctr" anchorCtr="1"/>
+          <a:lstStyle/>
+          <a:p>
+            <a:pPr>
+              <a:defRPr sz="900" b="0" i="0" u="none" strike="noStrike" kern="1200" baseline="0">
+                <a:solidFill>
+                  <a:schemeClr val="tx1">
+                    <a:lumMod val="65000"/>
+                    <a:lumOff val="35000"/>
+                  </a:schemeClr>
+                </a:solidFill>
+                <a:latin typeface="Times New Roman" panose="02020603050405020304" pitchFamily="18" charset="0"/>
+                <a:ea typeface="+mn-ea"/>
+                <a:cs typeface="Times New Roman" panose="02020603050405020304" pitchFamily="18" charset="0"/>
+              </a:defRPr>
+            </a:pPr>
+            <a:endParaRPr lang="en-US"/>
+          </a:p>
+        </c:txPr>
+        <c:crossAx val="711894728"/>
+        <c:crosses val="autoZero"/>
+        <c:auto val="1"/>
+        <c:lblAlgn val="ctr"/>
+        <c:lblOffset val="100"/>
+        <c:noMultiLvlLbl val="0"/>
+      </c:catAx>
+      <c:valAx>
+        <c:axId val="711894728"/>
+        <c:scaling>
+          <c:orientation val="minMax"/>
+          <c:min val="42879"/>
+        </c:scaling>
+        <c:delete val="0"/>
+        <c:axPos val="t"/>
+        <c:majorGridlines>
+          <c:spPr>
+            <a:ln w="9525" cap="flat" cmpd="sng" algn="ctr">
+              <a:solidFill>
+                <a:schemeClr val="tx1">
+                  <a:lumMod val="15000"/>
+                  <a:lumOff val="85000"/>
+                </a:schemeClr>
+              </a:solidFill>
+              <a:round/>
+            </a:ln>
+            <a:effectLst/>
+          </c:spPr>
+        </c:majorGridlines>
+        <c:numFmt formatCode="m/d/yyyy" sourceLinked="1"/>
+        <c:majorTickMark val="none"/>
+        <c:minorTickMark val="none"/>
+        <c:tickLblPos val="low"/>
+        <c:spPr>
+          <a:noFill/>
+          <a:ln>
+            <a:noFill/>
+          </a:ln>
+          <a:effectLst/>
+        </c:spPr>
+        <c:txPr>
+          <a:bodyPr rot="-60000000" spcFirstLastPara="1" vertOverflow="ellipsis" vert="horz" wrap="square" anchor="ctr" anchorCtr="1"/>
+          <a:lstStyle/>
+          <a:p>
+            <a:pPr>
+              <a:defRPr sz="900" b="0" i="0" u="none" strike="noStrike" kern="1200" baseline="0">
+                <a:solidFill>
+                  <a:schemeClr val="tx1">
+                    <a:lumMod val="65000"/>
+                    <a:lumOff val="35000"/>
+                  </a:schemeClr>
+                </a:solidFill>
+                <a:latin typeface="Times New Roman" panose="02020603050405020304" pitchFamily="18" charset="0"/>
+                <a:ea typeface="+mn-ea"/>
+                <a:cs typeface="Times New Roman" panose="02020603050405020304" pitchFamily="18" charset="0"/>
+              </a:defRPr>
+            </a:pPr>
+            <a:endParaRPr lang="en-US"/>
+          </a:p>
+        </c:txPr>
+        <c:crossAx val="711894336"/>
+        <c:crosses val="autoZero"/>
+        <c:crossBetween val="between"/>
+      </c:valAx>
+      <c:spPr>
+        <a:noFill/>
+        <a:ln>
+          <a:noFill/>
+        </a:ln>
+        <a:effectLst/>
+      </c:spPr>
+    </c:plotArea>
+    <c:plotVisOnly val="1"/>
+    <c:dispBlanksAs val="gap"/>
+    <c:showDLblsOverMax val="0"/>
+  </c:chart>
+  <c:spPr>
+    <a:noFill/>
+    <a:ln>
+      <a:noFill/>
+    </a:ln>
+    <a:effectLst/>
+  </c:spPr>
+  <c:txPr>
+    <a:bodyPr/>
+    <a:lstStyle/>
+    <a:p>
+      <a:pPr>
+        <a:defRPr>
+          <a:latin typeface="Times New Roman" panose="02020603050405020304" pitchFamily="18" charset="0"/>
+          <a:cs typeface="Times New Roman" panose="02020603050405020304" pitchFamily="18" charset="0"/>
+        </a:defRPr>
+      </a:pPr>
+      <a:endParaRPr lang="en-US"/>
+    </a:p>
+  </c:txPr>
+  <c:externalData r:id="rId4">
+    <c:autoUpdate val="0"/>
+  </c:externalData>
+</c:chartSpace>
+</file>
+
+<file path=ppt/charts/colors1.xml><?xml version="1.0" encoding="utf-8"?>
+<cs:colorStyle xmlns:cs="http://schemas.microsoft.com/office/drawing/2012/chartStyle" xmlns:a="http://schemas.openxmlformats.org/drawingml/2006/main" meth="cycle" id="10">
+  <a:schemeClr val="accent1"/>
+  <a:schemeClr val="accent2"/>
+  <a:schemeClr val="accent3"/>
+  <a:schemeClr val="accent4"/>
+  <a:schemeClr val="accent5"/>
+  <a:schemeClr val="accent6"/>
+  <cs:variation/>
+  <cs:variation>
+    <a:lumMod val="60000"/>
+  </cs:variation>
+  <cs:variation>
+    <a:lumMod val="80000"/>
+    <a:lumOff val="20000"/>
+  </cs:variation>
+  <cs:variation>
+    <a:lumMod val="80000"/>
+  </cs:variation>
+  <cs:variation>
+    <a:lumMod val="60000"/>
+    <a:lumOff val="40000"/>
+  </cs:variation>
+  <cs:variation>
+    <a:lumMod val="50000"/>
+  </cs:variation>
+  <cs:variation>
+    <a:lumMod val="70000"/>
+    <a:lumOff val="30000"/>
+  </cs:variation>
+  <cs:variation>
+    <a:lumMod val="70000"/>
+  </cs:variation>
+  <cs:variation>
+    <a:lumMod val="50000"/>
+    <a:lumOff val="50000"/>
+  </cs:variation>
+</cs:colorStyle>
+</file>
+
+<file path=ppt/charts/style1.xml><?xml version="1.0" encoding="utf-8"?>
+<cs:chartStyle xmlns:cs="http://schemas.microsoft.com/office/drawing/2012/chartStyle" xmlns:a="http://schemas.openxmlformats.org/drawingml/2006/main" id="216">
+  <cs:axisTitle>
+    <cs:lnRef idx="0"/>
+    <cs:fillRef idx="0"/>
+    <cs:effectRef idx="0"/>
+    <cs:fontRef idx="minor">
+      <a:schemeClr val="tx1">
+        <a:lumMod val="65000"/>
+        <a:lumOff val="35000"/>
+      </a:schemeClr>
+    </cs:fontRef>
+    <cs:defRPr sz="1000" kern="1200"/>
+  </cs:axisTitle>
+  <cs:categoryAxis>
+    <cs:lnRef idx="0"/>
+    <cs:fillRef idx="0"/>
+    <cs:effectRef idx="0"/>
+    <cs:fontRef idx="minor">
+      <a:schemeClr val="tx1">
+        <a:lumMod val="65000"/>
+        <a:lumOff val="35000"/>
+      </a:schemeClr>
+    </cs:fontRef>
+    <cs:spPr>
+      <a:ln w="9525" cap="flat" cmpd="sng" algn="ctr">
+        <a:solidFill>
+          <a:schemeClr val="tx1">
+            <a:lumMod val="15000"/>
+            <a:lumOff val="85000"/>
+          </a:schemeClr>
+        </a:solidFill>
+        <a:round/>
+      </a:ln>
+    </cs:spPr>
+    <cs:defRPr sz="900" kern="1200"/>
+  </cs:categoryAxis>
+  <cs:chartArea mods="allowNoFillOverride allowNoLineOverride">
+    <cs:lnRef idx="0"/>
+    <cs:fillRef idx="0"/>
+    <cs:effectRef idx="0"/>
+    <cs:fontRef idx="minor">
+      <a:schemeClr val="tx1"/>
+    </cs:fontRef>
+    <cs:spPr>
+      <a:solidFill>
+        <a:schemeClr val="bg1"/>
+      </a:solidFill>
+      <a:ln w="9525" cap="flat" cmpd="sng" algn="ctr">
+        <a:solidFill>
+          <a:schemeClr val="tx1">
+            <a:lumMod val="15000"/>
+            <a:lumOff val="85000"/>
+          </a:schemeClr>
+        </a:solidFill>
+        <a:round/>
+      </a:ln>
+    </cs:spPr>
+    <cs:defRPr sz="1000" kern="1200"/>
+  </cs:chartArea>
+  <cs:dataLabel>
+    <cs:lnRef idx="0"/>
+    <cs:fillRef idx="0"/>
+    <cs:effectRef idx="0"/>
+    <cs:fontRef idx="minor">
+      <a:schemeClr val="tx1">
+        <a:lumMod val="75000"/>
+        <a:lumOff val="25000"/>
+      </a:schemeClr>
+    </cs:fontRef>
+    <cs:defRPr sz="900" kern="1200"/>
+  </cs:dataLabel>
+  <cs:dataLabelCallout>
+    <cs:lnRef idx="0"/>
+    <cs:fillRef idx="0"/>
+    <cs:effectRef idx="0"/>
+    <cs:fontRef idx="minor">
+      <a:schemeClr val="dk1">
+        <a:lumMod val="65000"/>
+        <a:lumOff val="35000"/>
+      </a:schemeClr>
+    </cs:fontRef>
+    <cs:spPr>
+      <a:solidFill>
+        <a:schemeClr val="lt1"/>
+      </a:solidFill>
+      <a:ln>
+        <a:solidFill>
+          <a:schemeClr val="dk1">
+            <a:lumMod val="25000"/>
+            <a:lumOff val="75000"/>
+          </a:schemeClr>
+        </a:solidFill>
+      </a:ln>
+    </cs:spPr>
+    <cs:defRPr sz="900" kern="1200"/>
+    <cs:bodyPr rot="0" spcFirstLastPara="1" vertOverflow="clip" horzOverflow="clip" vert="horz" wrap="square" lIns="36576" tIns="18288" rIns="36576" bIns="18288" anchor="ctr" anchorCtr="1">
+      <a:spAutoFit/>
+    </cs:bodyPr>
+  </cs:dataLabelCallout>
+  <cs:dataPoint>
+    <cs:lnRef idx="0"/>
+    <cs:fillRef idx="1">
+      <cs:styleClr val="auto"/>
+    </cs:fillRef>
+    <cs:effectRef idx="0"/>
+    <cs:fontRef idx="minor">
+      <a:schemeClr val="tx1"/>
+    </cs:fontRef>
+  </cs:dataPoint>
+  <cs:dataPoint3D>
+    <cs:lnRef idx="0"/>
+    <cs:fillRef idx="1">
+      <cs:styleClr val="auto"/>
+    </cs:fillRef>
+    <cs:effectRef idx="0"/>
+    <cs:fontRef idx="minor">
+      <a:schemeClr val="tx1"/>
+    </cs:fontRef>
+  </cs:dataPoint3D>
+  <cs:dataPointLine>
+    <cs:lnRef idx="0">
+      <cs:styleClr val="auto"/>
+    </cs:lnRef>
+    <cs:fillRef idx="1"/>
+    <cs:effectRef idx="0"/>
+    <cs:fontRef idx="minor">
+      <a:schemeClr val="tx1"/>
+    </cs:fontRef>
+    <cs:spPr>
+      <a:ln w="28575" cap="rnd">
+        <a:solidFill>
+          <a:schemeClr val="phClr"/>
+        </a:solidFill>
+        <a:round/>
+      </a:ln>
+    </cs:spPr>
+  </cs:dataPointLine>
+  <cs:dataPointMarker>
+    <cs:lnRef idx="0">
+      <cs:styleClr val="auto"/>
+    </cs:lnRef>
+    <cs:fillRef idx="1">
+      <cs:styleClr val="auto"/>
+    </cs:fillRef>
+    <cs:effectRef idx="0"/>
+    <cs:fontRef idx="minor">
+      <a:schemeClr val="tx1"/>
+    </cs:fontRef>
+    <cs:spPr>
+      <a:ln w="9525">
+        <a:solidFill>
+          <a:schemeClr val="phClr"/>
+        </a:solidFill>
+      </a:ln>
+    </cs:spPr>
+  </cs:dataPointMarker>
+  <cs:dataPointMarkerLayout symbol="circle" size="5"/>
+  <cs:dataPointWireframe>
+    <cs:lnRef idx="0">
+      <cs:styleClr val="auto"/>
+    </cs:lnRef>
+    <cs:fillRef idx="1"/>
+    <cs:effectRef idx="0"/>
+    <cs:fontRef idx="minor">
+      <a:schemeClr val="tx1"/>
+    </cs:fontRef>
+    <cs:spPr>
+      <a:ln w="9525" cap="rnd">
+        <a:solidFill>
+          <a:schemeClr val="phClr"/>
+        </a:solidFill>
+        <a:round/>
+      </a:ln>
+    </cs:spPr>
+  </cs:dataPointWireframe>
+  <cs:dataTable>
+    <cs:lnRef idx="0"/>
+    <cs:fillRef idx="0"/>
+    <cs:effectRef idx="0"/>
+    <cs:fontRef idx="minor">
+      <a:schemeClr val="tx1">
+        <a:lumMod val="65000"/>
+        <a:lumOff val="35000"/>
+      </a:schemeClr>
+    </cs:fontRef>
+    <cs:spPr>
+      <a:noFill/>
+      <a:ln w="9525" cap="flat" cmpd="sng" algn="ctr">
+        <a:solidFill>
+          <a:schemeClr val="tx1">
+            <a:lumMod val="15000"/>
+            <a:lumOff val="85000"/>
+          </a:schemeClr>
+        </a:solidFill>
+        <a:round/>
+      </a:ln>
+    </cs:spPr>
+    <cs:defRPr sz="900" kern="1200"/>
+  </cs:dataTable>
+  <cs:downBar>
+    <cs:lnRef idx="0"/>
+    <cs:fillRef idx="0"/>
+    <cs:effectRef idx="0"/>
+    <cs:fontRef idx="minor">
+      <a:schemeClr val="tx1"/>
+    </cs:fontRef>
+    <cs:spPr>
+      <a:solidFill>
+        <a:schemeClr val="dk1">
+          <a:lumMod val="75000"/>
+          <a:lumOff val="25000"/>
+        </a:schemeClr>
+      </a:solidFill>
+      <a:ln w="9525" cap="flat" cmpd="sng" algn="ctr">
+        <a:solidFill>
+          <a:schemeClr val="tx1">
+            <a:lumMod val="65000"/>
+            <a:lumOff val="35000"/>
+          </a:schemeClr>
+        </a:solidFill>
+        <a:round/>
+      </a:ln>
+    </cs:spPr>
+  </cs:downBar>
+  <cs:dropLine>
+    <cs:lnRef idx="0"/>
+    <cs:fillRef idx="0"/>
+    <cs:effectRef idx="0"/>
+    <cs:fontRef idx="minor">
+      <a:schemeClr val="tx1"/>
+    </cs:fontRef>
+    <cs:spPr>
+      <a:ln w="9525" cap="flat" cmpd="sng" algn="ctr">
+        <a:solidFill>
+          <a:schemeClr val="tx1">
+            <a:lumMod val="35000"/>
+            <a:lumOff val="65000"/>
+          </a:schemeClr>
+        </a:solidFill>
+        <a:round/>
+      </a:ln>
+    </cs:spPr>
+  </cs:dropLine>
+  <cs:errorBar>
+    <cs:lnRef idx="0"/>
+    <cs:fillRef idx="0"/>
+    <cs:effectRef idx="0"/>
+    <cs:fontRef idx="minor">
+      <a:schemeClr val="tx1"/>
+    </cs:fontRef>
+    <cs:spPr>
+      <a:ln w="9525" cap="flat" cmpd="sng" algn="ctr">
+        <a:solidFill>
+          <a:schemeClr val="tx1">
+            <a:lumMod val="65000"/>
+            <a:lumOff val="35000"/>
+          </a:schemeClr>
+        </a:solidFill>
+        <a:round/>
+      </a:ln>
+    </cs:spPr>
+  </cs:errorBar>
+  <cs:floor>
+    <cs:lnRef idx="0"/>
+    <cs:fillRef idx="0"/>
+    <cs:effectRef idx="0"/>
+    <cs:fontRef idx="minor">
+      <a:schemeClr val="tx1"/>
+    </cs:fontRef>
+    <cs:spPr>
+      <a:noFill/>
+      <a:ln>
+        <a:noFill/>
+      </a:ln>
+    </cs:spPr>
+  </cs:floor>
+  <cs:gridlineMajor>
+    <cs:lnRef idx="0"/>
+    <cs:fillRef idx="0"/>
+    <cs:effectRef idx="0"/>
+    <cs:fontRef idx="minor">
+      <a:schemeClr val="tx1"/>
+    </cs:fontRef>
+    <cs:spPr>
+      <a:ln w="9525" cap="flat" cmpd="sng" algn="ctr">
+        <a:solidFill>
+          <a:schemeClr val="tx1">
+            <a:lumMod val="15000"/>
+            <a:lumOff val="85000"/>
+          </a:schemeClr>
+        </a:solidFill>
+        <a:round/>
+      </a:ln>
+    </cs:spPr>
+  </cs:gridlineMajor>
+  <cs:gridlineMinor>
+    <cs:lnRef idx="0"/>
+    <cs:fillRef idx="0"/>
+    <cs:effectRef idx="0"/>
+    <cs:fontRef idx="minor">
+      <a:schemeClr val="tx1"/>
+    </cs:fontRef>
+    <cs:spPr>
+      <a:ln w="9525" cap="flat" cmpd="sng" algn="ctr">
+        <a:solidFill>
+          <a:schemeClr val="tx1">
+            <a:lumMod val="5000"/>
+            <a:lumOff val="95000"/>
+          </a:schemeClr>
+        </a:solidFill>
+        <a:round/>
+      </a:ln>
+    </cs:spPr>
+  </cs:gridlineMinor>
+  <cs:hiLoLine>
+    <cs:lnRef idx="0"/>
+    <cs:fillRef idx="0"/>
+    <cs:effectRef idx="0"/>
+    <cs:fontRef idx="minor">
+      <a:schemeClr val="tx1"/>
+    </cs:fontRef>
+    <cs:spPr>
+      <a:ln w="9525" cap="flat" cmpd="sng" algn="ctr">
+        <a:solidFill>
+          <a:schemeClr val="tx1">
+            <a:lumMod val="50000"/>
+            <a:lumOff val="50000"/>
+          </a:schemeClr>
+        </a:solidFill>
+        <a:round/>
+      </a:ln>
+    </cs:spPr>
+  </cs:hiLoLine>
+  <cs:leaderLine>
+    <cs:lnRef idx="0"/>
+    <cs:fillRef idx="0"/>
+    <cs:effectRef idx="0"/>
+    <cs:fontRef idx="minor">
+      <a:schemeClr val="tx1"/>
+    </cs:fontRef>
+    <cs:spPr>
+      <a:ln w="9525" cap="flat" cmpd="sng" algn="ctr">
+        <a:solidFill>
+          <a:schemeClr val="tx1">
+            <a:lumMod val="35000"/>
+            <a:lumOff val="65000"/>
+          </a:schemeClr>
+        </a:solidFill>
+        <a:round/>
+      </a:ln>
+    </cs:spPr>
+  </cs:leaderLine>
+  <cs:legend>
+    <cs:lnRef idx="0"/>
+    <cs:fillRef idx="0"/>
+    <cs:effectRef idx="0"/>
+    <cs:fontRef idx="minor">
+      <a:schemeClr val="tx1">
+        <a:lumMod val="65000"/>
+        <a:lumOff val="35000"/>
+      </a:schemeClr>
+    </cs:fontRef>
+    <cs:defRPr sz="900" kern="1200"/>
+  </cs:legend>
+  <cs:plotArea mods="allowNoFillOverride allowNoLineOverride">
+    <cs:lnRef idx="0"/>
+    <cs:fillRef idx="0"/>
+    <cs:effectRef idx="0"/>
+    <cs:fontRef idx="minor">
+      <a:schemeClr val="tx1"/>
+    </cs:fontRef>
+  </cs:plotArea>
+  <cs:plotArea3D mods="allowNoFillOverride allowNoLineOverride">
+    <cs:lnRef idx="0"/>
+    <cs:fillRef idx="0"/>
+    <cs:effectRef idx="0"/>
+    <cs:fontRef idx="minor">
+      <a:schemeClr val="tx1"/>
+    </cs:fontRef>
+  </cs:plotArea3D>
+  <cs:seriesAxis>
+    <cs:lnRef idx="0"/>
+    <cs:fillRef idx="0"/>
+    <cs:effectRef idx="0"/>
+    <cs:fontRef idx="minor">
+      <a:schemeClr val="tx1">
+        <a:lumMod val="65000"/>
+        <a:lumOff val="35000"/>
+      </a:schemeClr>
+    </cs:fontRef>
+    <cs:defRPr sz="900" kern="1200"/>
+  </cs:seriesAxis>
+  <cs:seriesLine>
+    <cs:lnRef idx="0"/>
+    <cs:fillRef idx="0"/>
+    <cs:effectRef idx="0"/>
+    <cs:fontRef idx="minor">
+      <a:schemeClr val="tx1"/>
+    </cs:fontRef>
+    <cs:spPr>
+      <a:ln w="9525" cap="flat" cmpd="sng" algn="ctr">
+        <a:solidFill>
+          <a:schemeClr val="tx1">
+            <a:lumMod val="35000"/>
+            <a:lumOff val="65000"/>
+          </a:schemeClr>
+        </a:solidFill>
+        <a:round/>
+      </a:ln>
+    </cs:spPr>
+  </cs:seriesLine>
+  <cs:title>
+    <cs:lnRef idx="0"/>
+    <cs:fillRef idx="0"/>
+    <cs:effectRef idx="0"/>
+    <cs:fontRef idx="minor">
+      <a:schemeClr val="tx1">
+        <a:lumMod val="65000"/>
+        <a:lumOff val="35000"/>
+      </a:schemeClr>
+    </cs:fontRef>
+    <cs:defRPr sz="1400" b="0" kern="1200" spc="0" baseline="0"/>
+  </cs:title>
+  <cs:trendline>
+    <cs:lnRef idx="0">
+      <cs:styleClr val="auto"/>
+    </cs:lnRef>
+    <cs:fillRef idx="0"/>
+    <cs:effectRef idx="0"/>
+    <cs:fontRef idx="minor">
+      <a:schemeClr val="tx1"/>
+    </cs:fontRef>
+    <cs:spPr>
+      <a:ln w="19050" cap="rnd">
+        <a:solidFill>
+          <a:schemeClr val="phClr"/>
+        </a:solidFill>
+        <a:prstDash val="sysDot"/>
+      </a:ln>
+    </cs:spPr>
+  </cs:trendline>
+  <cs:trendlineLabel>
+    <cs:lnRef idx="0"/>
+    <cs:fillRef idx="0"/>
+    <cs:effectRef idx="0"/>
+    <cs:fontRef idx="minor">
+      <a:schemeClr val="tx1">
+        <a:lumMod val="65000"/>
+        <a:lumOff val="35000"/>
+      </a:schemeClr>
+    </cs:fontRef>
+    <cs:defRPr sz="900" kern="1200"/>
+  </cs:trendlineLabel>
+  <cs:upBar>
+    <cs:lnRef idx="0"/>
+    <cs:fillRef idx="0"/>
+    <cs:effectRef idx="0"/>
+    <cs:fontRef idx="minor">
+      <a:schemeClr val="tx1"/>
+    </cs:fontRef>
+    <cs:spPr>
+      <a:solidFill>
+        <a:schemeClr val="lt1"/>
+      </a:solidFill>
+      <a:ln w="9525" cap="flat" cmpd="sng" algn="ctr">
+        <a:solidFill>
+          <a:schemeClr val="tx1">
+            <a:lumMod val="65000"/>
+            <a:lumOff val="35000"/>
+          </a:schemeClr>
+        </a:solidFill>
+        <a:round/>
+      </a:ln>
+    </cs:spPr>
+  </cs:upBar>
+  <cs:valueAxis>
+    <cs:lnRef idx="0"/>
+    <cs:fillRef idx="0"/>
+    <cs:effectRef idx="0"/>
+    <cs:fontRef idx="minor">
+      <a:schemeClr val="tx1">
+        <a:lumMod val="65000"/>
+        <a:lumOff val="35000"/>
+      </a:schemeClr>
+    </cs:fontRef>
+    <cs:defRPr sz="900" kern="1200"/>
+  </cs:valueAxis>
+  <cs:wall>
+    <cs:lnRef idx="0"/>
+    <cs:fillRef idx="0"/>
+    <cs:effectRef idx="0"/>
+    <cs:fontRef idx="minor">
+      <a:schemeClr val="tx1"/>
+    </cs:fontRef>
+    <cs:spPr>
+      <a:noFill/>
+      <a:ln>
+        <a:noFill/>
+      </a:ln>
+    </cs:spPr>
+  </cs:wall>
+</cs:chartStyle>
+</file>
+
 <file path=ppt/notesMasters/notesMaster1.xml><?xml version="1.0" encoding="utf-8"?>
 <p:notesMaster xmlns:a="http://schemas.openxmlformats.org/drawingml/2006/main" xmlns:r="http://schemas.openxmlformats.org/officeDocument/2006/relationships" xmlns:p="http://schemas.openxmlformats.org/presentationml/2006/main">
   <p:cSld>
@@ -206,7 +1365,7 @@
           <a:p>
             <a:fld id="{2B431595-44DA-4FEC-B837-7EF25C36E313}" type="datetimeFigureOut">
               <a:rPr lang="en-US" smtClean="0"/>
-              <a:t>6/4/2017</a:t>
+              <a:t>6/5/2017</a:t>
             </a:fld>
             <a:endParaRPr lang="en-US"/>
           </a:p>
@@ -956,7 +2115,7 @@
           <a:p>
             <a:fld id="{F9B74556-12F9-40FA-BD29-031FD15AF59E}" type="datetimeFigureOut">
               <a:rPr lang="en-US" smtClean="0"/>
-              <a:t>6/4/2017</a:t>
+              <a:t>6/5/2017</a:t>
             </a:fld>
             <a:endParaRPr lang="en-US"/>
           </a:p>
@@ -1124,7 +2283,7 @@
           <a:p>
             <a:fld id="{F9B74556-12F9-40FA-BD29-031FD15AF59E}" type="datetimeFigureOut">
               <a:rPr lang="en-US" smtClean="0"/>
-              <a:t>6/4/2017</a:t>
+              <a:t>6/5/2017</a:t>
             </a:fld>
             <a:endParaRPr lang="en-US"/>
           </a:p>
@@ -1302,7 +2461,7 @@
           <a:p>
             <a:fld id="{F9B74556-12F9-40FA-BD29-031FD15AF59E}" type="datetimeFigureOut">
               <a:rPr lang="en-US" smtClean="0"/>
-              <a:t>6/4/2017</a:t>
+              <a:t>6/5/2017</a:t>
             </a:fld>
             <a:endParaRPr lang="en-US"/>
           </a:p>
@@ -1770,7 +2929,7 @@
           <a:p>
             <a:fld id="{F9B74556-12F9-40FA-BD29-031FD15AF59E}" type="datetimeFigureOut">
               <a:rPr lang="en-US" smtClean="0"/>
-              <a:t>6/4/2017</a:t>
+              <a:t>6/5/2017</a:t>
             </a:fld>
             <a:endParaRPr lang="en-US"/>
           </a:p>
@@ -2015,7 +3174,7 @@
           <a:p>
             <a:fld id="{F9B74556-12F9-40FA-BD29-031FD15AF59E}" type="datetimeFigureOut">
               <a:rPr lang="en-US" smtClean="0"/>
-              <a:t>6/4/2017</a:t>
+              <a:t>6/5/2017</a:t>
             </a:fld>
             <a:endParaRPr lang="en-US"/>
           </a:p>
@@ -2244,7 +3403,7 @@
           <a:p>
             <a:fld id="{F9B74556-12F9-40FA-BD29-031FD15AF59E}" type="datetimeFigureOut">
               <a:rPr lang="en-US" smtClean="0"/>
-              <a:t>6/4/2017</a:t>
+              <a:t>6/5/2017</a:t>
             </a:fld>
             <a:endParaRPr lang="en-US"/>
           </a:p>
@@ -2608,7 +3767,7 @@
           <a:p>
             <a:fld id="{F9B74556-12F9-40FA-BD29-031FD15AF59E}" type="datetimeFigureOut">
               <a:rPr lang="en-US" smtClean="0"/>
-              <a:t>6/4/2017</a:t>
+              <a:t>6/5/2017</a:t>
             </a:fld>
             <a:endParaRPr lang="en-US"/>
           </a:p>
@@ -2725,7 +3884,7 @@
           <a:p>
             <a:fld id="{F9B74556-12F9-40FA-BD29-031FD15AF59E}" type="datetimeFigureOut">
               <a:rPr lang="en-US" smtClean="0"/>
-              <a:t>6/4/2017</a:t>
+              <a:t>6/5/2017</a:t>
             </a:fld>
             <a:endParaRPr lang="en-US"/>
           </a:p>
@@ -2820,7 +3979,7 @@
           <a:p>
             <a:fld id="{F9B74556-12F9-40FA-BD29-031FD15AF59E}" type="datetimeFigureOut">
               <a:rPr lang="en-US" smtClean="0"/>
-              <a:t>6/4/2017</a:t>
+              <a:t>6/5/2017</a:t>
             </a:fld>
             <a:endParaRPr lang="en-US"/>
           </a:p>
@@ -3095,7 +4254,7 @@
           <a:p>
             <a:fld id="{F9B74556-12F9-40FA-BD29-031FD15AF59E}" type="datetimeFigureOut">
               <a:rPr lang="en-US" smtClean="0"/>
-              <a:t>6/4/2017</a:t>
+              <a:t>6/5/2017</a:t>
             </a:fld>
             <a:endParaRPr lang="en-US"/>
           </a:p>
@@ -3306,7 +4465,7 @@
           <a:p>
             <a:fld id="{F9B74556-12F9-40FA-BD29-031FD15AF59E}" type="datetimeFigureOut">
               <a:rPr lang="en-US" smtClean="0"/>
-              <a:t>6/4/2017</a:t>
+              <a:t>6/5/2017</a:t>
             </a:fld>
             <a:endParaRPr lang="en-US"/>
           </a:p>
@@ -3916,23 +5075,143 @@
           <a:lstStyle/>
           <a:p>
             <a:r>
-              <a:rPr lang="en-US" sz="1800" dirty="0">
+              <a:rPr lang="en-US" sz="1800" dirty="0" smtClean="0">
                 <a:solidFill>
                   <a:schemeClr val="tx1"/>
                 </a:solidFill>
               </a:rPr>
-              <a:t>Areas without image coverage, do these correlate to poverty or underserved communities?</a:t>
-            </a:r>
-          </a:p>
-          <a:p>
-            <a:r>
-              <a:rPr lang="en-US" sz="1800" dirty="0">
+              <a:t>Creation of an adequate data set of labeled/</a:t>
+            </a:r>
+            <a:r>
+              <a:rPr lang="en-US" sz="1800" dirty="0" err="1" smtClean="0">
                 <a:solidFill>
                   <a:schemeClr val="tx1"/>
                 </a:solidFill>
               </a:rPr>
-              <a:t>Terms of Service for Google SV</a:t>
-            </a:r>
+              <a:t>wireframed</a:t>
+            </a:r>
+            <a:r>
+              <a:rPr lang="en-US" sz="1800" dirty="0" smtClean="0">
+                <a:solidFill>
+                  <a:schemeClr val="tx1"/>
+                </a:solidFill>
+              </a:rPr>
+              <a:t> images for training model</a:t>
+            </a:r>
+          </a:p>
+          <a:p>
+            <a:pPr lvl="1"/>
+            <a:r>
+              <a:rPr lang="en-US" sz="1600" dirty="0" smtClean="0">
+                <a:solidFill>
+                  <a:schemeClr val="tx1"/>
+                </a:solidFill>
+              </a:rPr>
+              <a:t>This is a lot of hands on time!</a:t>
+            </a:r>
+          </a:p>
+          <a:p>
+            <a:pPr lvl="1"/>
+            <a:r>
+              <a:rPr lang="en-US" sz="1600" dirty="0" smtClean="0">
+                <a:solidFill>
+                  <a:schemeClr val="tx1"/>
+                </a:solidFill>
+              </a:rPr>
+              <a:t>There’s probably a best method of performing this task, that we hope to uncover through prior research</a:t>
+            </a:r>
+          </a:p>
+          <a:p>
+            <a:pPr lvl="1"/>
+            <a:endParaRPr lang="en-US" sz="1600" dirty="0">
+              <a:solidFill>
+                <a:schemeClr val="tx1"/>
+              </a:solidFill>
+            </a:endParaRPr>
+          </a:p>
+          <a:p>
+            <a:r>
+              <a:rPr lang="en-US" dirty="0" smtClean="0">
+                <a:solidFill>
+                  <a:schemeClr val="tx1"/>
+                </a:solidFill>
+              </a:rPr>
+              <a:t>Integration with prior data collection from UMD Project Sidewalk team</a:t>
+            </a:r>
+          </a:p>
+          <a:p>
+            <a:pPr lvl="1"/>
+            <a:r>
+              <a:rPr lang="en-US" dirty="0" smtClean="0">
+                <a:solidFill>
+                  <a:schemeClr val="tx1"/>
+                </a:solidFill>
+              </a:rPr>
+              <a:t>Existing base of ~67,000 labeled images</a:t>
+            </a:r>
+          </a:p>
+          <a:p>
+            <a:pPr lvl="1"/>
+            <a:endParaRPr lang="en-US" dirty="0">
+              <a:solidFill>
+                <a:schemeClr val="tx1"/>
+              </a:solidFill>
+            </a:endParaRPr>
+          </a:p>
+          <a:p>
+            <a:r>
+              <a:rPr lang="en-US" dirty="0" smtClean="0">
+                <a:solidFill>
+                  <a:schemeClr val="tx1"/>
+                </a:solidFill>
+              </a:rPr>
+              <a:t>Learning the available convolutional </a:t>
+            </a:r>
+            <a:r>
+              <a:rPr lang="en-US" smtClean="0">
+                <a:solidFill>
+                  <a:schemeClr val="tx1"/>
+                </a:solidFill>
+              </a:rPr>
+              <a:t>neural networks</a:t>
+            </a:r>
+            <a:endParaRPr lang="en-US" dirty="0" smtClean="0">
+              <a:solidFill>
+                <a:schemeClr val="tx1"/>
+              </a:solidFill>
+            </a:endParaRPr>
+          </a:p>
+          <a:p>
+            <a:pPr lvl="1"/>
+            <a:endParaRPr lang="en-US" sz="1600" dirty="0">
+              <a:solidFill>
+                <a:schemeClr val="tx1"/>
+              </a:solidFill>
+            </a:endParaRPr>
+          </a:p>
+          <a:p>
+            <a:pPr lvl="1"/>
+            <a:endParaRPr lang="en-US" sz="1600" dirty="0" smtClean="0">
+              <a:solidFill>
+                <a:schemeClr val="tx1"/>
+              </a:solidFill>
+            </a:endParaRPr>
+          </a:p>
+          <a:p>
+            <a:pPr lvl="1"/>
+            <a:endParaRPr lang="en-US" sz="1600" dirty="0">
+              <a:solidFill>
+                <a:schemeClr val="tx1"/>
+              </a:solidFill>
+            </a:endParaRPr>
+          </a:p>
+          <a:p>
+            <a:pPr lvl="1"/>
+            <a:endParaRPr lang="en-US" sz="1600" dirty="0">
+              <a:solidFill>
+                <a:schemeClr val="tx1"/>
+              </a:solidFill>
+            </a:endParaRPr>
           </a:p>
           <a:p>
             <a:endParaRPr lang="en-US" sz="1800" dirty="0"/>
@@ -3985,6 +5264,147 @@
           <a:lstStyle/>
           <a:p>
             <a:r>
+              <a:rPr lang="en-US" sz="2400" b="1" dirty="0" smtClean="0">
+                <a:solidFill>
+                  <a:schemeClr val="accent3"/>
+                </a:solidFill>
+                <a:latin typeface="Arial" panose="020B0604020202020204" pitchFamily="34" charset="0"/>
+                <a:cs typeface="Arial" panose="020B0604020202020204" pitchFamily="34" charset="0"/>
+              </a:rPr>
+              <a:t>Major Steps</a:t>
+            </a:r>
+            <a:endParaRPr lang="en-US" sz="2400" b="1" dirty="0">
+              <a:solidFill>
+                <a:schemeClr val="accent3"/>
+              </a:solidFill>
+              <a:latin typeface="Arial" panose="020B0604020202020204" pitchFamily="34" charset="0"/>
+              <a:cs typeface="Arial" panose="020B0604020202020204" pitchFamily="34" charset="0"/>
+            </a:endParaRPr>
+          </a:p>
+        </p:txBody>
+      </p:sp>
+    </p:spTree>
+    <p:extLst>
+      <p:ext uri="{BB962C8B-B14F-4D97-AF65-F5344CB8AC3E}">
+        <p14:creationId xmlns:p14="http://schemas.microsoft.com/office/powerpoint/2010/main" val="3263685899"/>
+      </p:ext>
+    </p:extLst>
+  </p:cSld>
+  <p:clrMapOvr>
+    <a:masterClrMapping/>
+  </p:clrMapOvr>
+</p:sld>
+</file>
+
+<file path=ppt/slides/slide11.xml><?xml version="1.0" encoding="utf-8"?>
+<p:sld xmlns:a="http://schemas.openxmlformats.org/drawingml/2006/main" xmlns:r="http://schemas.openxmlformats.org/officeDocument/2006/relationships" xmlns:p="http://schemas.openxmlformats.org/presentationml/2006/main">
+  <p:cSld>
+    <p:spTree>
+      <p:nvGrpSpPr>
+        <p:cNvPr id="1" name=""/>
+        <p:cNvGrpSpPr/>
+        <p:nvPr/>
+      </p:nvGrpSpPr>
+      <p:grpSpPr>
+        <a:xfrm>
+          <a:off x="0" y="0"/>
+          <a:ext cx="0" cy="0"/>
+          <a:chOff x="0" y="0"/>
+          <a:chExt cx="0" cy="0"/>
+        </a:xfrm>
+      </p:grpSpPr>
+      <p:sp>
+        <p:nvSpPr>
+          <p:cNvPr id="2" name="Content Placeholder 1"/>
+          <p:cNvSpPr>
+            <a:spLocks noGrp="1"/>
+          </p:cNvSpPr>
+          <p:nvPr>
+            <p:ph idx="1"/>
+          </p:nvPr>
+        </p:nvSpPr>
+        <p:spPr>
+          <a:xfrm>
+            <a:off x="609600" y="1080293"/>
+            <a:ext cx="10972800" cy="4568031"/>
+          </a:xfrm>
+        </p:spPr>
+        <p:txBody>
+          <a:bodyPr>
+            <a:normAutofit/>
+          </a:bodyPr>
+          <a:lstStyle/>
+          <a:p>
+            <a:r>
+              <a:rPr lang="en-US" sz="1800" dirty="0">
+                <a:solidFill>
+                  <a:schemeClr val="tx1"/>
+                </a:solidFill>
+              </a:rPr>
+              <a:t>Areas without image coverage, do these correlate to poverty or underserved communities?</a:t>
+            </a:r>
+          </a:p>
+          <a:p>
+            <a:r>
+              <a:rPr lang="en-US" sz="1800" dirty="0">
+                <a:solidFill>
+                  <a:schemeClr val="tx1"/>
+                </a:solidFill>
+              </a:rPr>
+              <a:t>Terms of Service for Google SV</a:t>
+            </a:r>
+          </a:p>
+          <a:p>
+            <a:endParaRPr lang="en-US" sz="1800" dirty="0"/>
+          </a:p>
+        </p:txBody>
+      </p:sp>
+      <p:sp>
+        <p:nvSpPr>
+          <p:cNvPr id="4" name="Slide Number Placeholder 3"/>
+          <p:cNvSpPr>
+            <a:spLocks noGrp="1"/>
+          </p:cNvSpPr>
+          <p:nvPr>
+            <p:ph type="sldNum" sz="quarter" idx="12"/>
+          </p:nvPr>
+        </p:nvSpPr>
+        <p:spPr/>
+        <p:txBody>
+          <a:bodyPr/>
+          <a:lstStyle/>
+          <a:p>
+            <a:fld id="{B5C1F4F4-A082-40CA-B36A-B0C2125DDA09}" type="slidenum">
+              <a:rPr lang="en-US" smtClean="0"/>
+              <a:t>11</a:t>
+            </a:fld>
+            <a:endParaRPr lang="en-US"/>
+          </a:p>
+        </p:txBody>
+      </p:sp>
+      <p:sp>
+        <p:nvSpPr>
+          <p:cNvPr id="5" name="TextBox 4"/>
+          <p:cNvSpPr txBox="1"/>
+          <p:nvPr/>
+        </p:nvSpPr>
+        <p:spPr>
+          <a:xfrm>
+            <a:off x="609600" y="200025"/>
+            <a:ext cx="10972800" cy="461665"/>
+          </a:xfrm>
+          <a:prstGeom prst="rect">
+            <a:avLst/>
+          </a:prstGeom>
+          <a:noFill/>
+        </p:spPr>
+        <p:txBody>
+          <a:bodyPr wrap="square" rtlCol="0">
+            <a:spAutoFit/>
+          </a:bodyPr>
+          <a:lstStyle/>
+          <a:p>
+            <a:r>
               <a:rPr lang="en-US" sz="2400" b="1" dirty="0">
                 <a:solidFill>
                   <a:schemeClr val="accent3"/>
@@ -4000,7 +5420,7 @@
     </p:spTree>
     <p:extLst>
       <p:ext uri="{BB962C8B-B14F-4D97-AF65-F5344CB8AC3E}">
-        <p14:creationId xmlns:p14="http://schemas.microsoft.com/office/powerpoint/2010/main" val="3263685899"/>
+        <p14:creationId xmlns:p14="http://schemas.microsoft.com/office/powerpoint/2010/main" val="4213706921"/>
       </p:ext>
     </p:extLst>
   </p:cSld>
@@ -4749,7 +6169,7 @@
           <p:nvPr/>
         </p:nvPicPr>
         <p:blipFill>
-          <a:blip r:embed="rId2">
+          <a:blip r:embed="rId2" cstate="print">
             <a:extLst>
               <a:ext uri="{28A0092B-C50C-407E-A947-70E740481C1C}">
                 <a14:useLocalDpi xmlns:a14="http://schemas.microsoft.com/office/drawing/2010/main" val="0"/>
@@ -6280,42 +7700,6 @@
       </p:grpSpPr>
       <p:sp>
         <p:nvSpPr>
-          <p:cNvPr id="2" name="Content Placeholder 1"/>
-          <p:cNvSpPr>
-            <a:spLocks noGrp="1"/>
-          </p:cNvSpPr>
-          <p:nvPr>
-            <p:ph idx="1"/>
-          </p:nvPr>
-        </p:nvSpPr>
-        <p:spPr>
-          <a:xfrm>
-            <a:off x="609600" y="1080293"/>
-            <a:ext cx="10972800" cy="4568031"/>
-          </a:xfrm>
-        </p:spPr>
-        <p:txBody>
-          <a:bodyPr>
-            <a:normAutofit/>
-          </a:bodyPr>
-          <a:lstStyle/>
-          <a:p>
-            <a:r>
-              <a:rPr lang="en-US" sz="1800" dirty="0">
-                <a:solidFill>
-                  <a:schemeClr val="tx1"/>
-                </a:solidFill>
-              </a:rPr>
-              <a:t>UMD Project can be an example of similar process</a:t>
-            </a:r>
-          </a:p>
-          <a:p>
-            <a:endParaRPr lang="en-US" sz="1800" dirty="0"/>
-          </a:p>
-        </p:txBody>
-      </p:sp>
-      <p:sp>
-        <p:nvSpPr>
           <p:cNvPr id="4" name="Slide Number Placeholder 3"/>
           <p:cNvSpPr>
             <a:spLocks noGrp="1"/>
@@ -6346,7 +7730,7 @@
         <p:spPr>
           <a:xfrm>
             <a:off x="609600" y="200025"/>
-            <a:ext cx="10972800" cy="461665"/>
+            <a:ext cx="10972800" cy="400110"/>
           </a:xfrm>
           <a:prstGeom prst="rect">
             <a:avLst/>
@@ -6360,35 +7744,171 @@
           <a:lstStyle/>
           <a:p>
             <a:r>
-              <a:rPr lang="en-US" sz="2400" b="1" dirty="0">
+              <a:rPr lang="en-US" sz="2000" b="1" dirty="0" smtClean="0">
                 <a:solidFill>
                   <a:schemeClr val="accent3"/>
                 </a:solidFill>
                 <a:latin typeface="Arial" panose="020B0604020202020204" pitchFamily="34" charset="0"/>
                 <a:cs typeface="Arial" panose="020B0604020202020204" pitchFamily="34" charset="0"/>
               </a:rPr>
-              <a:t>Describe the Process of </a:t>
-            </a:r>
-            <a:r>
-              <a:rPr lang="en-US" sz="2400" b="1" dirty="0" err="1">
-                <a:solidFill>
-                  <a:schemeClr val="accent3"/>
-                </a:solidFill>
-                <a:latin typeface="Arial" panose="020B0604020202020204" pitchFamily="34" charset="0"/>
-                <a:cs typeface="Arial" panose="020B0604020202020204" pitchFamily="34" charset="0"/>
-              </a:rPr>
-              <a:t>Wireframing</a:t>
-            </a:r>
-            <a:r>
-              <a:rPr lang="en-US" sz="2400" b="1" dirty="0">
-                <a:solidFill>
-                  <a:schemeClr val="accent3"/>
-                </a:solidFill>
-                <a:latin typeface="Arial" panose="020B0604020202020204" pitchFamily="34" charset="0"/>
-                <a:cs typeface="Arial" panose="020B0604020202020204" pitchFamily="34" charset="0"/>
-              </a:rPr>
-              <a:t> Sidewalk On Image</a:t>
-            </a:r>
+              <a:t>Project Sidewalk – University of Maryland Seeks to Document accessibility</a:t>
+            </a:r>
+          </a:p>
+        </p:txBody>
+      </p:sp>
+      <p:sp>
+        <p:nvSpPr>
+          <p:cNvPr id="3" name="Content Placeholder 2"/>
+          <p:cNvSpPr>
+            <a:spLocks noGrp="1"/>
+          </p:cNvSpPr>
+          <p:nvPr>
+            <p:ph idx="1"/>
+          </p:nvPr>
+        </p:nvSpPr>
+        <p:spPr>
+          <a:xfrm>
+            <a:off x="6951518" y="1604168"/>
+            <a:ext cx="4630882" cy="4568031"/>
+          </a:xfrm>
+        </p:spPr>
+        <p:txBody>
+          <a:bodyPr/>
+          <a:lstStyle/>
+          <a:p>
+            <a:r>
+              <a:rPr lang="en-US" dirty="0" smtClean="0"/>
+              <a:t>Project combines Google Street View image data with crowd sourced labor to review intersections and document locations of curb cuts</a:t>
+            </a:r>
+          </a:p>
+          <a:p>
+            <a:endParaRPr lang="en-US" dirty="0"/>
+          </a:p>
+          <a:p>
+            <a:r>
+              <a:rPr lang="en-US" dirty="0" smtClean="0"/>
+              <a:t>Uses Java script online tool called “</a:t>
+            </a:r>
+            <a:r>
+              <a:rPr lang="en-US" dirty="0" err="1" smtClean="0"/>
+              <a:t>svLabel</a:t>
+            </a:r>
+            <a:r>
+              <a:rPr lang="en-US" dirty="0" smtClean="0"/>
+              <a:t>” to label features in images using a wire-frame style layer</a:t>
+            </a:r>
+          </a:p>
+          <a:p>
+            <a:endParaRPr lang="en-US" dirty="0"/>
+          </a:p>
+          <a:p>
+            <a:r>
+              <a:rPr lang="en-US" dirty="0" smtClean="0"/>
+              <a:t>Work in </a:t>
+            </a:r>
+            <a:r>
+              <a:rPr lang="en-US" dirty="0" err="1" smtClean="0"/>
+              <a:t>svLabel</a:t>
+            </a:r>
+            <a:r>
+              <a:rPr lang="en-US" dirty="0" smtClean="0"/>
+              <a:t> is followed by </a:t>
+            </a:r>
+            <a:r>
+              <a:rPr lang="en-US" dirty="0" err="1" smtClean="0"/>
+              <a:t>svDetect</a:t>
+            </a:r>
+            <a:r>
+              <a:rPr lang="en-US" dirty="0" smtClean="0"/>
+              <a:t> and </a:t>
+            </a:r>
+            <a:r>
+              <a:rPr lang="en-US" dirty="0" err="1" smtClean="0"/>
+              <a:t>svVerify</a:t>
+            </a:r>
+            <a:r>
+              <a:rPr lang="en-US" dirty="0" smtClean="0"/>
+              <a:t> to label additional images and then to verify outputs</a:t>
+            </a:r>
+          </a:p>
+          <a:p>
+            <a:endParaRPr lang="en-US" dirty="0"/>
+          </a:p>
+          <a:p>
+            <a:endParaRPr lang="en-US" dirty="0" smtClean="0"/>
+          </a:p>
+          <a:p>
+            <a:endParaRPr lang="en-US" dirty="0"/>
+          </a:p>
+        </p:txBody>
+      </p:sp>
+      <p:pic>
+        <p:nvPicPr>
+          <p:cNvPr id="7" name="Picture 6"/>
+          <p:cNvPicPr>
+            <a:picLocks noChangeAspect="1"/>
+          </p:cNvPicPr>
+          <p:nvPr/>
+        </p:nvPicPr>
+        <p:blipFill>
+          <a:blip r:embed="rId2"/>
+          <a:stretch>
+            <a:fillRect/>
+          </a:stretch>
+        </p:blipFill>
+        <p:spPr>
+          <a:xfrm>
+            <a:off x="103043" y="1504084"/>
+            <a:ext cx="6848475" cy="4133850"/>
+          </a:xfrm>
+          <a:prstGeom prst="rect">
+            <a:avLst/>
+          </a:prstGeom>
+        </p:spPr>
+      </p:pic>
+      <p:sp>
+        <p:nvSpPr>
+          <p:cNvPr id="8" name="TextBox 7"/>
+          <p:cNvSpPr txBox="1"/>
+          <p:nvPr/>
+        </p:nvSpPr>
+        <p:spPr>
+          <a:xfrm>
+            <a:off x="609600" y="6207853"/>
+            <a:ext cx="8693791" cy="215444"/>
+          </a:xfrm>
+          <a:prstGeom prst="rect">
+            <a:avLst/>
+          </a:prstGeom>
+          <a:noFill/>
+        </p:spPr>
+        <p:txBody>
+          <a:bodyPr wrap="square" rtlCol="0">
+            <a:spAutoFit/>
+          </a:bodyPr>
+          <a:lstStyle/>
+          <a:p>
+            <a:r>
+              <a:rPr lang="en-US" sz="800" dirty="0" smtClean="0"/>
+              <a:t>SOURCE: Hara, Sun, Moore et al: “</a:t>
+            </a:r>
+            <a:r>
+              <a:rPr lang="en-US" sz="800" dirty="0" err="1" smtClean="0"/>
+              <a:t>Tohme</a:t>
+            </a:r>
+            <a:r>
+              <a:rPr lang="en-US" sz="800" dirty="0" smtClean="0"/>
+              <a:t>: Detecting Curb Ramps in Google Street View Using Crowdsourcing, Computer Vision, and Machine Learning.”  </a:t>
+            </a:r>
+            <a:r>
+              <a:rPr lang="en-US" sz="800" i="1" dirty="0" smtClean="0"/>
+              <a:t>UIST ‘13, </a:t>
+            </a:r>
+            <a:r>
+              <a:rPr lang="en-US" sz="800" dirty="0" smtClean="0"/>
+              <a:t>Honolulu, HI.</a:t>
+            </a:r>
+            <a:endParaRPr lang="en-US" sz="800" dirty="0"/>
           </a:p>
         </p:txBody>
       </p:sp>
@@ -6424,42 +7944,6 @@
       </p:grpSpPr>
       <p:sp>
         <p:nvSpPr>
-          <p:cNvPr id="2" name="Content Placeholder 1"/>
-          <p:cNvSpPr>
-            <a:spLocks noGrp="1"/>
-          </p:cNvSpPr>
-          <p:nvPr>
-            <p:ph idx="1"/>
-          </p:nvPr>
-        </p:nvSpPr>
-        <p:spPr>
-          <a:xfrm>
-            <a:off x="609600" y="1080293"/>
-            <a:ext cx="10972800" cy="4568031"/>
-          </a:xfrm>
-        </p:spPr>
-        <p:txBody>
-          <a:bodyPr>
-            <a:normAutofit/>
-          </a:bodyPr>
-          <a:lstStyle/>
-          <a:p>
-            <a:r>
-              <a:rPr lang="en-US" sz="1800" dirty="0">
-                <a:solidFill>
-                  <a:schemeClr val="tx1"/>
-                </a:solidFill>
-              </a:rPr>
-              <a:t>Probably show the Gantt chart, and talk about major needs like labeled data sets</a:t>
-            </a:r>
-          </a:p>
-          <a:p>
-            <a:endParaRPr lang="en-US" sz="1800" dirty="0"/>
-          </a:p>
-        </p:txBody>
-      </p:sp>
-      <p:sp>
-        <p:nvSpPr>
           <p:cNvPr id="4" name="Slide Number Placeholder 3"/>
           <p:cNvSpPr>
             <a:spLocks noGrp="1"/>
@@ -6516,6 +8000,30 @@
           </a:p>
         </p:txBody>
       </p:sp>
+      <p:graphicFrame>
+        <p:nvGraphicFramePr>
+          <p:cNvPr id="6" name="Chart 5"/>
+          <p:cNvGraphicFramePr>
+            <a:graphicFrameLocks/>
+          </p:cNvGraphicFramePr>
+          <p:nvPr>
+            <p:extLst>
+              <p:ext uri="{D42A27DB-BD31-4B8C-83A1-F6EECF244321}">
+                <p14:modId xmlns:p14="http://schemas.microsoft.com/office/powerpoint/2010/main" val="961593459"/>
+              </p:ext>
+            </p:extLst>
+          </p:nvPr>
+        </p:nvGraphicFramePr>
+        <p:xfrm>
+          <a:off x="1047750" y="661690"/>
+          <a:ext cx="10096500" cy="5486400"/>
+        </p:xfrm>
+        <a:graphic>
+          <a:graphicData uri="http://schemas.openxmlformats.org/drawingml/2006/chart">
+            <c:chart xmlns:c="http://schemas.openxmlformats.org/drawingml/2006/chart" xmlns:r="http://schemas.openxmlformats.org/officeDocument/2006/relationships" r:id="rId2"/>
+          </a:graphicData>
+        </a:graphic>
+      </p:graphicFrame>
     </p:spTree>
     <p:extLst>
       <p:ext uri="{BB962C8B-B14F-4D97-AF65-F5344CB8AC3E}">
@@ -7119,6 +8627,258 @@
 </a:theme>
 </file>
 
+<file path=ppt/theme/themeOverride1.xml><?xml version="1.0" encoding="utf-8"?>
+<a:themeOverride xmlns:a="http://schemas.openxmlformats.org/drawingml/2006/main">
+  <a:clrScheme name="Office">
+    <a:dk1>
+      <a:sysClr val="windowText" lastClr="000000"/>
+    </a:dk1>
+    <a:lt1>
+      <a:sysClr val="window" lastClr="FFFFFF"/>
+    </a:lt1>
+    <a:dk2>
+      <a:srgbClr val="44546A"/>
+    </a:dk2>
+    <a:lt2>
+      <a:srgbClr val="E7E6E6"/>
+    </a:lt2>
+    <a:accent1>
+      <a:srgbClr val="5B9BD5"/>
+    </a:accent1>
+    <a:accent2>
+      <a:srgbClr val="ED7D31"/>
+    </a:accent2>
+    <a:accent3>
+      <a:srgbClr val="A5A5A5"/>
+    </a:accent3>
+    <a:accent4>
+      <a:srgbClr val="FFC000"/>
+    </a:accent4>
+    <a:accent5>
+      <a:srgbClr val="4472C4"/>
+    </a:accent5>
+    <a:accent6>
+      <a:srgbClr val="70AD47"/>
+    </a:accent6>
+    <a:hlink>
+      <a:srgbClr val="0563C1"/>
+    </a:hlink>
+    <a:folHlink>
+      <a:srgbClr val="954F72"/>
+    </a:folHlink>
+  </a:clrScheme>
+  <a:fontScheme name="Office">
+    <a:majorFont>
+      <a:latin typeface="Calibri Light" panose="020F0302020204030204"/>
+      <a:ea typeface=""/>
+      <a:cs typeface=""/>
+      <a:font script="Jpan" typeface="ＭＳ Ｐゴシック"/>
+      <a:font script="Hang" typeface="맑은 고딕"/>
+      <a:font script="Hans" typeface="宋体"/>
+      <a:font script="Hant" typeface="新細明體"/>
+      <a:font script="Arab" typeface="Times New Roman"/>
+      <a:font script="Hebr" typeface="Times New Roman"/>
+      <a:font script="Thai" typeface="Tahoma"/>
+      <a:font script="Ethi" typeface="Nyala"/>
+      <a:font script="Beng" typeface="Vrinda"/>
+      <a:font script="Gujr" typeface="Shruti"/>
+      <a:font script="Khmr" typeface="MoolBoran"/>
+      <a:font script="Knda" typeface="Tunga"/>
+      <a:font script="Guru" typeface="Raavi"/>
+      <a:font script="Cans" typeface="Euphemia"/>
+      <a:font script="Cher" typeface="Plantagenet Cherokee"/>
+      <a:font script="Yiii" typeface="Microsoft Yi Baiti"/>
+      <a:font script="Tibt" typeface="Microsoft Himalaya"/>
+      <a:font script="Thaa" typeface="MV Boli"/>
+      <a:font script="Deva" typeface="Mangal"/>
+      <a:font script="Telu" typeface="Gautami"/>
+      <a:font script="Taml" typeface="Latha"/>
+      <a:font script="Syrc" typeface="Estrangelo Edessa"/>
+      <a:font script="Orya" typeface="Kalinga"/>
+      <a:font script="Mlym" typeface="Kartika"/>
+      <a:font script="Laoo" typeface="DokChampa"/>
+      <a:font script="Sinh" typeface="Iskoola Pota"/>
+      <a:font script="Mong" typeface="Mongolian Baiti"/>
+      <a:font script="Viet" typeface="Times New Roman"/>
+      <a:font script="Uigh" typeface="Microsoft Uighur"/>
+      <a:font script="Geor" typeface="Sylfaen"/>
+    </a:majorFont>
+    <a:minorFont>
+      <a:latin typeface="Calibri" panose="020F0502020204030204"/>
+      <a:ea typeface=""/>
+      <a:cs typeface=""/>
+      <a:font script="Jpan" typeface="ＭＳ Ｐゴシック"/>
+      <a:font script="Hang" typeface="맑은 고딕"/>
+      <a:font script="Hans" typeface="宋体"/>
+      <a:font script="Hant" typeface="新細明體"/>
+      <a:font script="Arab" typeface="Arial"/>
+      <a:font script="Hebr" typeface="Arial"/>
+      <a:font script="Thai" typeface="Tahoma"/>
+      <a:font script="Ethi" typeface="Nyala"/>
+      <a:font script="Beng" typeface="Vrinda"/>
+      <a:font script="Gujr" typeface="Shruti"/>
+      <a:font script="Khmr" typeface="DaunPenh"/>
+      <a:font script="Knda" typeface="Tunga"/>
+      <a:font script="Guru" typeface="Raavi"/>
+      <a:font script="Cans" typeface="Euphemia"/>
+      <a:font script="Cher" typeface="Plantagenet Cherokee"/>
+      <a:font script="Yiii" typeface="Microsoft Yi Baiti"/>
+      <a:font script="Tibt" typeface="Microsoft Himalaya"/>
+      <a:font script="Thaa" typeface="MV Boli"/>
+      <a:font script="Deva" typeface="Mangal"/>
+      <a:font script="Telu" typeface="Gautami"/>
+      <a:font script="Taml" typeface="Latha"/>
+      <a:font script="Syrc" typeface="Estrangelo Edessa"/>
+      <a:font script="Orya" typeface="Kalinga"/>
+      <a:font script="Mlym" typeface="Kartika"/>
+      <a:font script="Laoo" typeface="DokChampa"/>
+      <a:font script="Sinh" typeface="Iskoola Pota"/>
+      <a:font script="Mong" typeface="Mongolian Baiti"/>
+      <a:font script="Viet" typeface="Arial"/>
+      <a:font script="Uigh" typeface="Microsoft Uighur"/>
+      <a:font script="Geor" typeface="Sylfaen"/>
+    </a:minorFont>
+  </a:fontScheme>
+  <a:fmtScheme name="Office">
+    <a:fillStyleLst>
+      <a:solidFill>
+        <a:schemeClr val="phClr"/>
+      </a:solidFill>
+      <a:gradFill rotWithShape="1">
+        <a:gsLst>
+          <a:gs pos="0">
+            <a:schemeClr val="phClr">
+              <a:lumMod val="110000"/>
+              <a:satMod val="105000"/>
+              <a:tint val="67000"/>
+            </a:schemeClr>
+          </a:gs>
+          <a:gs pos="50000">
+            <a:schemeClr val="phClr">
+              <a:lumMod val="105000"/>
+              <a:satMod val="103000"/>
+              <a:tint val="73000"/>
+            </a:schemeClr>
+          </a:gs>
+          <a:gs pos="100000">
+            <a:schemeClr val="phClr">
+              <a:lumMod val="105000"/>
+              <a:satMod val="109000"/>
+              <a:tint val="81000"/>
+            </a:schemeClr>
+          </a:gs>
+        </a:gsLst>
+        <a:lin ang="5400000" scaled="0"/>
+      </a:gradFill>
+      <a:gradFill rotWithShape="1">
+        <a:gsLst>
+          <a:gs pos="0">
+            <a:schemeClr val="phClr">
+              <a:satMod val="103000"/>
+              <a:lumMod val="102000"/>
+              <a:tint val="94000"/>
+            </a:schemeClr>
+          </a:gs>
+          <a:gs pos="50000">
+            <a:schemeClr val="phClr">
+              <a:satMod val="110000"/>
+              <a:lumMod val="100000"/>
+              <a:shade val="100000"/>
+            </a:schemeClr>
+          </a:gs>
+          <a:gs pos="100000">
+            <a:schemeClr val="phClr">
+              <a:lumMod val="99000"/>
+              <a:satMod val="120000"/>
+              <a:shade val="78000"/>
+            </a:schemeClr>
+          </a:gs>
+        </a:gsLst>
+        <a:lin ang="5400000" scaled="0"/>
+      </a:gradFill>
+    </a:fillStyleLst>
+    <a:lnStyleLst>
+      <a:ln w="6350" cap="flat" cmpd="sng" algn="ctr">
+        <a:solidFill>
+          <a:schemeClr val="phClr"/>
+        </a:solidFill>
+        <a:prstDash val="solid"/>
+        <a:miter lim="800000"/>
+      </a:ln>
+      <a:ln w="12700" cap="flat" cmpd="sng" algn="ctr">
+        <a:solidFill>
+          <a:schemeClr val="phClr"/>
+        </a:solidFill>
+        <a:prstDash val="solid"/>
+        <a:miter lim="800000"/>
+      </a:ln>
+      <a:ln w="19050" cap="flat" cmpd="sng" algn="ctr">
+        <a:solidFill>
+          <a:schemeClr val="phClr"/>
+        </a:solidFill>
+        <a:prstDash val="solid"/>
+        <a:miter lim="800000"/>
+      </a:ln>
+    </a:lnStyleLst>
+    <a:effectStyleLst>
+      <a:effectStyle>
+        <a:effectLst/>
+      </a:effectStyle>
+      <a:effectStyle>
+        <a:effectLst/>
+      </a:effectStyle>
+      <a:effectStyle>
+        <a:effectLst>
+          <a:outerShdw blurRad="57150" dist="19050" dir="5400000" algn="ctr" rotWithShape="0">
+            <a:srgbClr val="000000">
+              <a:alpha val="63000"/>
+            </a:srgbClr>
+          </a:outerShdw>
+        </a:effectLst>
+      </a:effectStyle>
+    </a:effectStyleLst>
+    <a:bgFillStyleLst>
+      <a:solidFill>
+        <a:schemeClr val="phClr"/>
+      </a:solidFill>
+      <a:solidFill>
+        <a:schemeClr val="phClr">
+          <a:tint val="95000"/>
+          <a:satMod val="170000"/>
+        </a:schemeClr>
+      </a:solidFill>
+      <a:gradFill rotWithShape="1">
+        <a:gsLst>
+          <a:gs pos="0">
+            <a:schemeClr val="phClr">
+              <a:tint val="93000"/>
+              <a:satMod val="150000"/>
+              <a:shade val="98000"/>
+              <a:lumMod val="102000"/>
+            </a:schemeClr>
+          </a:gs>
+          <a:gs pos="50000">
+            <a:schemeClr val="phClr">
+              <a:tint val="98000"/>
+              <a:satMod val="130000"/>
+              <a:shade val="90000"/>
+              <a:lumMod val="103000"/>
+            </a:schemeClr>
+          </a:gs>
+          <a:gs pos="100000">
+            <a:schemeClr val="phClr">
+              <a:shade val="63000"/>
+              <a:satMod val="120000"/>
+            </a:schemeClr>
+          </a:gs>
+        </a:gsLst>
+        <a:lin ang="5400000" scaled="0"/>
+      </a:gradFill>
+    </a:bgFillStyleLst>
+  </a:fmtScheme>
+</a:themeOverride>
+</file>
+
 <file path=customXml/item1.xml><?xml version="1.0" encoding="utf-8"?>
 <EsriMapsInfo xmlns="ESRI.ArcGIS.Mapping.OfficeIntegration.PowerPointInfo">
   <Version>Version1</Version>
@@ -7134,7 +8894,7 @@
 </file>
 
 <file path=customXml/itemProps1.xml><?xml version="1.0" encoding="utf-8"?>
-<ds:datastoreItem xmlns:ds="http://schemas.openxmlformats.org/officeDocument/2006/customXml" ds:itemID="{69EE975F-0E37-4B06-9453-1384D43C5CE8}">
+<ds:datastoreItem xmlns:ds="http://schemas.openxmlformats.org/officeDocument/2006/customXml" ds:itemID="{F2EBFCF9-D869-4614-AEAC-D83618EE55BC}">
   <ds:schemaRefs>
     <ds:schemaRef ds:uri="ESRI.ArcGIS.Mapping.OfficeIntegration.PowerPointInfo"/>
   </ds:schemaRefs>
@@ -7142,7 +8902,7 @@
 </file>
 
 <file path=customXml/itemProps2.xml><?xml version="1.0" encoding="utf-8"?>
-<ds:datastoreItem xmlns:ds="http://schemas.openxmlformats.org/officeDocument/2006/customXml" ds:itemID="{F2EBFCF9-D869-4614-AEAC-D83618EE55BC}">
+<ds:datastoreItem xmlns:ds="http://schemas.openxmlformats.org/officeDocument/2006/customXml" ds:itemID="{E19F317A-32B5-48C2-8960-D5B25E252577}">
   <ds:schemaRefs>
     <ds:schemaRef ds:uri="ESRI.ArcGIS.Mapping.OfficeIntegration.PowerPointInfo"/>
   </ds:schemaRefs>

</xml_diff>